<commit_message>
Adicionando 3 cenarios nos artefatos
</commit_message>
<xml_diff>
--- a/artefatos/16 - DFD Essencial para cada Capacidade.pptx
+++ b/artefatos/16 - DFD Essencial para cada Capacidade.pptx
@@ -10,6 +10,7 @@
     <p:sldId id="258" r:id="rId4"/>
     <p:sldId id="259" r:id="rId5"/>
     <p:sldId id="260" r:id="rId6"/>
+    <p:sldId id="261" r:id="rId7"/>
   </p:sldIdLst>
   <p:sldSz cx="12192000" cy="6858000"/>
   <p:notesSz cx="6858000" cy="9144000"/>
@@ -158,10 +159,9 @@
           </a:lstStyle>
           <a:p>
             <a:r>
-              <a:rPr lang="pt-BR" smtClean="0"/>
+              <a:rPr lang="pt-BR"/>
               <a:t>Clique para editar o título mestre</a:t>
             </a:r>
-            <a:endParaRPr lang="pt-BR"/>
           </a:p>
         </p:txBody>
       </p:sp>
@@ -223,10 +223,9 @@
           </a:lstStyle>
           <a:p>
             <a:r>
-              <a:rPr lang="pt-BR" smtClean="0"/>
+              <a:rPr lang="pt-BR"/>
               <a:t>Clique para editar o estilo do subtítulo mestre</a:t>
             </a:r>
-            <a:endParaRPr lang="pt-BR"/>
           </a:p>
         </p:txBody>
       </p:sp>
@@ -247,7 +246,7 @@
           <a:p>
             <a:fld id="{6F6F9BBC-5669-453D-8C75-07C41C1632E4}" type="datetimeFigureOut">
               <a:rPr lang="pt-BR" smtClean="0"/>
-              <a:t>18/10/2020</a:t>
+              <a:t>02/11/2020</a:t>
             </a:fld>
             <a:endParaRPr lang="pt-BR"/>
           </a:p>
@@ -341,10 +340,9 @@
           <a:lstStyle/>
           <a:p>
             <a:r>
-              <a:rPr lang="pt-BR" smtClean="0"/>
+              <a:rPr lang="pt-BR"/>
               <a:t>Clique para editar o título mestre</a:t>
             </a:r>
-            <a:endParaRPr lang="pt-BR"/>
           </a:p>
         </p:txBody>
       </p:sp>
@@ -365,38 +363,37 @@
           <a:p>
             <a:pPr lvl="0"/>
             <a:r>
-              <a:rPr lang="pt-BR" smtClean="0"/>
+              <a:rPr lang="pt-BR"/>
               <a:t>Clique para editar o texto mestre</a:t>
             </a:r>
           </a:p>
           <a:p>
             <a:pPr lvl="1"/>
             <a:r>
-              <a:rPr lang="pt-BR" smtClean="0"/>
+              <a:rPr lang="pt-BR"/>
               <a:t>Segundo nível</a:t>
             </a:r>
           </a:p>
           <a:p>
             <a:pPr lvl="2"/>
             <a:r>
-              <a:rPr lang="pt-BR" smtClean="0"/>
+              <a:rPr lang="pt-BR"/>
               <a:t>Terceiro nível</a:t>
             </a:r>
           </a:p>
           <a:p>
             <a:pPr lvl="3"/>
             <a:r>
-              <a:rPr lang="pt-BR" smtClean="0"/>
+              <a:rPr lang="pt-BR"/>
               <a:t>Quarto nível</a:t>
             </a:r>
           </a:p>
           <a:p>
             <a:pPr lvl="4"/>
             <a:r>
-              <a:rPr lang="pt-BR" smtClean="0"/>
+              <a:rPr lang="pt-BR"/>
               <a:t>Quinto nível</a:t>
             </a:r>
-            <a:endParaRPr lang="pt-BR"/>
           </a:p>
         </p:txBody>
       </p:sp>
@@ -417,7 +414,7 @@
           <a:p>
             <a:fld id="{6F6F9BBC-5669-453D-8C75-07C41C1632E4}" type="datetimeFigureOut">
               <a:rPr lang="pt-BR" smtClean="0"/>
-              <a:t>18/10/2020</a:t>
+              <a:t>02/11/2020</a:t>
             </a:fld>
             <a:endParaRPr lang="pt-BR"/>
           </a:p>
@@ -516,10 +513,9 @@
           <a:lstStyle/>
           <a:p>
             <a:r>
-              <a:rPr lang="pt-BR" smtClean="0"/>
+              <a:rPr lang="pt-BR"/>
               <a:t>Clique para editar o título mestre</a:t>
             </a:r>
-            <a:endParaRPr lang="pt-BR"/>
           </a:p>
         </p:txBody>
       </p:sp>
@@ -545,38 +541,37 @@
           <a:p>
             <a:pPr lvl="0"/>
             <a:r>
-              <a:rPr lang="pt-BR" smtClean="0"/>
+              <a:rPr lang="pt-BR"/>
               <a:t>Clique para editar o texto mestre</a:t>
             </a:r>
           </a:p>
           <a:p>
             <a:pPr lvl="1"/>
             <a:r>
-              <a:rPr lang="pt-BR" smtClean="0"/>
+              <a:rPr lang="pt-BR"/>
               <a:t>Segundo nível</a:t>
             </a:r>
           </a:p>
           <a:p>
             <a:pPr lvl="2"/>
             <a:r>
-              <a:rPr lang="pt-BR" smtClean="0"/>
+              <a:rPr lang="pt-BR"/>
               <a:t>Terceiro nível</a:t>
             </a:r>
           </a:p>
           <a:p>
             <a:pPr lvl="3"/>
             <a:r>
-              <a:rPr lang="pt-BR" smtClean="0"/>
+              <a:rPr lang="pt-BR"/>
               <a:t>Quarto nível</a:t>
             </a:r>
           </a:p>
           <a:p>
             <a:pPr lvl="4"/>
             <a:r>
-              <a:rPr lang="pt-BR" smtClean="0"/>
+              <a:rPr lang="pt-BR"/>
               <a:t>Quinto nível</a:t>
             </a:r>
-            <a:endParaRPr lang="pt-BR"/>
           </a:p>
         </p:txBody>
       </p:sp>
@@ -597,7 +592,7 @@
           <a:p>
             <a:fld id="{6F6F9BBC-5669-453D-8C75-07C41C1632E4}" type="datetimeFigureOut">
               <a:rPr lang="pt-BR" smtClean="0"/>
-              <a:t>18/10/2020</a:t>
+              <a:t>02/11/2020</a:t>
             </a:fld>
             <a:endParaRPr lang="pt-BR"/>
           </a:p>
@@ -691,10 +686,9 @@
           <a:lstStyle/>
           <a:p>
             <a:r>
-              <a:rPr lang="pt-BR" smtClean="0"/>
+              <a:rPr lang="pt-BR"/>
               <a:t>Clique para editar o título mestre</a:t>
             </a:r>
-            <a:endParaRPr lang="pt-BR"/>
           </a:p>
         </p:txBody>
       </p:sp>
@@ -715,38 +709,37 @@
           <a:p>
             <a:pPr lvl="0"/>
             <a:r>
-              <a:rPr lang="pt-BR" smtClean="0"/>
+              <a:rPr lang="pt-BR"/>
               <a:t>Clique para editar o texto mestre</a:t>
             </a:r>
           </a:p>
           <a:p>
             <a:pPr lvl="1"/>
             <a:r>
-              <a:rPr lang="pt-BR" smtClean="0"/>
+              <a:rPr lang="pt-BR"/>
               <a:t>Segundo nível</a:t>
             </a:r>
           </a:p>
           <a:p>
             <a:pPr lvl="2"/>
             <a:r>
-              <a:rPr lang="pt-BR" smtClean="0"/>
+              <a:rPr lang="pt-BR"/>
               <a:t>Terceiro nível</a:t>
             </a:r>
           </a:p>
           <a:p>
             <a:pPr lvl="3"/>
             <a:r>
-              <a:rPr lang="pt-BR" smtClean="0"/>
+              <a:rPr lang="pt-BR"/>
               <a:t>Quarto nível</a:t>
             </a:r>
           </a:p>
           <a:p>
             <a:pPr lvl="4"/>
             <a:r>
-              <a:rPr lang="pt-BR" smtClean="0"/>
+              <a:rPr lang="pt-BR"/>
               <a:t>Quinto nível</a:t>
             </a:r>
-            <a:endParaRPr lang="pt-BR"/>
           </a:p>
         </p:txBody>
       </p:sp>
@@ -767,7 +760,7 @@
           <a:p>
             <a:fld id="{6F6F9BBC-5669-453D-8C75-07C41C1632E4}" type="datetimeFigureOut">
               <a:rPr lang="pt-BR" smtClean="0"/>
-              <a:t>18/10/2020</a:t>
+              <a:t>02/11/2020</a:t>
             </a:fld>
             <a:endParaRPr lang="pt-BR"/>
           </a:p>
@@ -870,10 +863,9 @@
           </a:lstStyle>
           <a:p>
             <a:r>
-              <a:rPr lang="pt-BR" smtClean="0"/>
+              <a:rPr lang="pt-BR"/>
               <a:t>Clique para editar o título mestre</a:t>
             </a:r>
-            <a:endParaRPr lang="pt-BR"/>
           </a:p>
         </p:txBody>
       </p:sp>
@@ -990,7 +982,7 @@
           <a:p>
             <a:pPr lvl="0"/>
             <a:r>
-              <a:rPr lang="pt-BR" smtClean="0"/>
+              <a:rPr lang="pt-BR"/>
               <a:t>Clique para editar o texto mestre</a:t>
             </a:r>
           </a:p>
@@ -1013,7 +1005,7 @@
           <a:p>
             <a:fld id="{6F6F9BBC-5669-453D-8C75-07C41C1632E4}" type="datetimeFigureOut">
               <a:rPr lang="pt-BR" smtClean="0"/>
-              <a:t>18/10/2020</a:t>
+              <a:t>02/11/2020</a:t>
             </a:fld>
             <a:endParaRPr lang="pt-BR"/>
           </a:p>
@@ -1107,10 +1099,9 @@
           <a:lstStyle/>
           <a:p>
             <a:r>
-              <a:rPr lang="pt-BR" smtClean="0"/>
+              <a:rPr lang="pt-BR"/>
               <a:t>Clique para editar o título mestre</a:t>
             </a:r>
-            <a:endParaRPr lang="pt-BR"/>
           </a:p>
         </p:txBody>
       </p:sp>
@@ -1136,38 +1127,37 @@
           <a:p>
             <a:pPr lvl="0"/>
             <a:r>
-              <a:rPr lang="pt-BR" smtClean="0"/>
+              <a:rPr lang="pt-BR"/>
               <a:t>Clique para editar o texto mestre</a:t>
             </a:r>
           </a:p>
           <a:p>
             <a:pPr lvl="1"/>
             <a:r>
-              <a:rPr lang="pt-BR" smtClean="0"/>
+              <a:rPr lang="pt-BR"/>
               <a:t>Segundo nível</a:t>
             </a:r>
           </a:p>
           <a:p>
             <a:pPr lvl="2"/>
             <a:r>
-              <a:rPr lang="pt-BR" smtClean="0"/>
+              <a:rPr lang="pt-BR"/>
               <a:t>Terceiro nível</a:t>
             </a:r>
           </a:p>
           <a:p>
             <a:pPr lvl="3"/>
             <a:r>
-              <a:rPr lang="pt-BR" smtClean="0"/>
+              <a:rPr lang="pt-BR"/>
               <a:t>Quarto nível</a:t>
             </a:r>
           </a:p>
           <a:p>
             <a:pPr lvl="4"/>
             <a:r>
-              <a:rPr lang="pt-BR" smtClean="0"/>
+              <a:rPr lang="pt-BR"/>
               <a:t>Quinto nível</a:t>
             </a:r>
-            <a:endParaRPr lang="pt-BR"/>
           </a:p>
         </p:txBody>
       </p:sp>
@@ -1193,38 +1183,37 @@
           <a:p>
             <a:pPr lvl="0"/>
             <a:r>
-              <a:rPr lang="pt-BR" smtClean="0"/>
+              <a:rPr lang="pt-BR"/>
               <a:t>Clique para editar o texto mestre</a:t>
             </a:r>
           </a:p>
           <a:p>
             <a:pPr lvl="1"/>
             <a:r>
-              <a:rPr lang="pt-BR" smtClean="0"/>
+              <a:rPr lang="pt-BR"/>
               <a:t>Segundo nível</a:t>
             </a:r>
           </a:p>
           <a:p>
             <a:pPr lvl="2"/>
             <a:r>
-              <a:rPr lang="pt-BR" smtClean="0"/>
+              <a:rPr lang="pt-BR"/>
               <a:t>Terceiro nível</a:t>
             </a:r>
           </a:p>
           <a:p>
             <a:pPr lvl="3"/>
             <a:r>
-              <a:rPr lang="pt-BR" smtClean="0"/>
+              <a:rPr lang="pt-BR"/>
               <a:t>Quarto nível</a:t>
             </a:r>
           </a:p>
           <a:p>
             <a:pPr lvl="4"/>
             <a:r>
-              <a:rPr lang="pt-BR" smtClean="0"/>
+              <a:rPr lang="pt-BR"/>
               <a:t>Quinto nível</a:t>
             </a:r>
-            <a:endParaRPr lang="pt-BR"/>
           </a:p>
         </p:txBody>
       </p:sp>
@@ -1245,7 +1234,7 @@
           <a:p>
             <a:fld id="{6F6F9BBC-5669-453D-8C75-07C41C1632E4}" type="datetimeFigureOut">
               <a:rPr lang="pt-BR" smtClean="0"/>
-              <a:t>18/10/2020</a:t>
+              <a:t>02/11/2020</a:t>
             </a:fld>
             <a:endParaRPr lang="pt-BR"/>
           </a:p>
@@ -1344,10 +1333,9 @@
           <a:lstStyle/>
           <a:p>
             <a:r>
-              <a:rPr lang="pt-BR" smtClean="0"/>
+              <a:rPr lang="pt-BR"/>
               <a:t>Clique para editar o título mestre</a:t>
             </a:r>
-            <a:endParaRPr lang="pt-BR"/>
           </a:p>
         </p:txBody>
       </p:sp>
@@ -1410,7 +1398,7 @@
           <a:p>
             <a:pPr lvl="0"/>
             <a:r>
-              <a:rPr lang="pt-BR" smtClean="0"/>
+              <a:rPr lang="pt-BR"/>
               <a:t>Clique para editar o texto mestre</a:t>
             </a:r>
           </a:p>
@@ -1438,38 +1426,37 @@
           <a:p>
             <a:pPr lvl="0"/>
             <a:r>
-              <a:rPr lang="pt-BR" smtClean="0"/>
+              <a:rPr lang="pt-BR"/>
               <a:t>Clique para editar o texto mestre</a:t>
             </a:r>
           </a:p>
           <a:p>
             <a:pPr lvl="1"/>
             <a:r>
-              <a:rPr lang="pt-BR" smtClean="0"/>
+              <a:rPr lang="pt-BR"/>
               <a:t>Segundo nível</a:t>
             </a:r>
           </a:p>
           <a:p>
             <a:pPr lvl="2"/>
             <a:r>
-              <a:rPr lang="pt-BR" smtClean="0"/>
+              <a:rPr lang="pt-BR"/>
               <a:t>Terceiro nível</a:t>
             </a:r>
           </a:p>
           <a:p>
             <a:pPr lvl="3"/>
             <a:r>
-              <a:rPr lang="pt-BR" smtClean="0"/>
+              <a:rPr lang="pt-BR"/>
               <a:t>Quarto nível</a:t>
             </a:r>
           </a:p>
           <a:p>
             <a:pPr lvl="4"/>
             <a:r>
-              <a:rPr lang="pt-BR" smtClean="0"/>
+              <a:rPr lang="pt-BR"/>
               <a:t>Quinto nível</a:t>
             </a:r>
-            <a:endParaRPr lang="pt-BR"/>
           </a:p>
         </p:txBody>
       </p:sp>
@@ -1532,7 +1519,7 @@
           <a:p>
             <a:pPr lvl="0"/>
             <a:r>
-              <a:rPr lang="pt-BR" smtClean="0"/>
+              <a:rPr lang="pt-BR"/>
               <a:t>Clique para editar o texto mestre</a:t>
             </a:r>
           </a:p>
@@ -1560,38 +1547,37 @@
           <a:p>
             <a:pPr lvl="0"/>
             <a:r>
-              <a:rPr lang="pt-BR" smtClean="0"/>
+              <a:rPr lang="pt-BR"/>
               <a:t>Clique para editar o texto mestre</a:t>
             </a:r>
           </a:p>
           <a:p>
             <a:pPr lvl="1"/>
             <a:r>
-              <a:rPr lang="pt-BR" smtClean="0"/>
+              <a:rPr lang="pt-BR"/>
               <a:t>Segundo nível</a:t>
             </a:r>
           </a:p>
           <a:p>
             <a:pPr lvl="2"/>
             <a:r>
-              <a:rPr lang="pt-BR" smtClean="0"/>
+              <a:rPr lang="pt-BR"/>
               <a:t>Terceiro nível</a:t>
             </a:r>
           </a:p>
           <a:p>
             <a:pPr lvl="3"/>
             <a:r>
-              <a:rPr lang="pt-BR" smtClean="0"/>
+              <a:rPr lang="pt-BR"/>
               <a:t>Quarto nível</a:t>
             </a:r>
           </a:p>
           <a:p>
             <a:pPr lvl="4"/>
             <a:r>
-              <a:rPr lang="pt-BR" smtClean="0"/>
+              <a:rPr lang="pt-BR"/>
               <a:t>Quinto nível</a:t>
             </a:r>
-            <a:endParaRPr lang="pt-BR"/>
           </a:p>
         </p:txBody>
       </p:sp>
@@ -1612,7 +1598,7 @@
           <a:p>
             <a:fld id="{6F6F9BBC-5669-453D-8C75-07C41C1632E4}" type="datetimeFigureOut">
               <a:rPr lang="pt-BR" smtClean="0"/>
-              <a:t>18/10/2020</a:t>
+              <a:t>02/11/2020</a:t>
             </a:fld>
             <a:endParaRPr lang="pt-BR"/>
           </a:p>
@@ -1706,10 +1692,9 @@
           <a:lstStyle/>
           <a:p>
             <a:r>
-              <a:rPr lang="pt-BR" smtClean="0"/>
+              <a:rPr lang="pt-BR"/>
               <a:t>Clique para editar o título mestre</a:t>
             </a:r>
-            <a:endParaRPr lang="pt-BR"/>
           </a:p>
         </p:txBody>
       </p:sp>
@@ -1730,7 +1715,7 @@
           <a:p>
             <a:fld id="{6F6F9BBC-5669-453D-8C75-07C41C1632E4}" type="datetimeFigureOut">
               <a:rPr lang="pt-BR" smtClean="0"/>
-              <a:t>18/10/2020</a:t>
+              <a:t>02/11/2020</a:t>
             </a:fld>
             <a:endParaRPr lang="pt-BR"/>
           </a:p>
@@ -1825,7 +1810,7 @@
           <a:p>
             <a:fld id="{6F6F9BBC-5669-453D-8C75-07C41C1632E4}" type="datetimeFigureOut">
               <a:rPr lang="pt-BR" smtClean="0"/>
-              <a:t>18/10/2020</a:t>
+              <a:t>02/11/2020</a:t>
             </a:fld>
             <a:endParaRPr lang="pt-BR"/>
           </a:p>
@@ -1928,10 +1913,9 @@
           </a:lstStyle>
           <a:p>
             <a:r>
-              <a:rPr lang="pt-BR" smtClean="0"/>
+              <a:rPr lang="pt-BR"/>
               <a:t>Clique para editar o título mestre</a:t>
             </a:r>
-            <a:endParaRPr lang="pt-BR"/>
           </a:p>
         </p:txBody>
       </p:sp>
@@ -1985,38 +1969,37 @@
           <a:p>
             <a:pPr lvl="0"/>
             <a:r>
-              <a:rPr lang="pt-BR" smtClean="0"/>
+              <a:rPr lang="pt-BR"/>
               <a:t>Clique para editar o texto mestre</a:t>
             </a:r>
           </a:p>
           <a:p>
             <a:pPr lvl="1"/>
             <a:r>
-              <a:rPr lang="pt-BR" smtClean="0"/>
+              <a:rPr lang="pt-BR"/>
               <a:t>Segundo nível</a:t>
             </a:r>
           </a:p>
           <a:p>
             <a:pPr lvl="2"/>
             <a:r>
-              <a:rPr lang="pt-BR" smtClean="0"/>
+              <a:rPr lang="pt-BR"/>
               <a:t>Terceiro nível</a:t>
             </a:r>
           </a:p>
           <a:p>
             <a:pPr lvl="3"/>
             <a:r>
-              <a:rPr lang="pt-BR" smtClean="0"/>
+              <a:rPr lang="pt-BR"/>
               <a:t>Quarto nível</a:t>
             </a:r>
           </a:p>
           <a:p>
             <a:pPr lvl="4"/>
             <a:r>
-              <a:rPr lang="pt-BR" smtClean="0"/>
+              <a:rPr lang="pt-BR"/>
               <a:t>Quinto nível</a:t>
             </a:r>
-            <a:endParaRPr lang="pt-BR"/>
           </a:p>
         </p:txBody>
       </p:sp>
@@ -2079,7 +2062,7 @@
           <a:p>
             <a:pPr lvl="0"/>
             <a:r>
-              <a:rPr lang="pt-BR" smtClean="0"/>
+              <a:rPr lang="pt-BR"/>
               <a:t>Clique para editar o texto mestre</a:t>
             </a:r>
           </a:p>
@@ -2102,7 +2085,7 @@
           <a:p>
             <a:fld id="{6F6F9BBC-5669-453D-8C75-07C41C1632E4}" type="datetimeFigureOut">
               <a:rPr lang="pt-BR" smtClean="0"/>
-              <a:t>18/10/2020</a:t>
+              <a:t>02/11/2020</a:t>
             </a:fld>
             <a:endParaRPr lang="pt-BR"/>
           </a:p>
@@ -2205,10 +2188,9 @@
           </a:lstStyle>
           <a:p>
             <a:r>
-              <a:rPr lang="pt-BR" smtClean="0"/>
+              <a:rPr lang="pt-BR"/>
               <a:t>Clique para editar o título mestre</a:t>
             </a:r>
-            <a:endParaRPr lang="pt-BR"/>
           </a:p>
         </p:txBody>
       </p:sp>
@@ -2332,7 +2314,7 @@
           <a:p>
             <a:pPr lvl="0"/>
             <a:r>
-              <a:rPr lang="pt-BR" smtClean="0"/>
+              <a:rPr lang="pt-BR"/>
               <a:t>Clique para editar o texto mestre</a:t>
             </a:r>
           </a:p>
@@ -2355,7 +2337,7 @@
           <a:p>
             <a:fld id="{6F6F9BBC-5669-453D-8C75-07C41C1632E4}" type="datetimeFigureOut">
               <a:rPr lang="pt-BR" smtClean="0"/>
-              <a:t>18/10/2020</a:t>
+              <a:t>02/11/2020</a:t>
             </a:fld>
             <a:endParaRPr lang="pt-BR"/>
           </a:p>
@@ -2464,10 +2446,9 @@
           <a:lstStyle/>
           <a:p>
             <a:r>
-              <a:rPr lang="pt-BR" smtClean="0"/>
+              <a:rPr lang="pt-BR"/>
               <a:t>Clique para editar o título mestre</a:t>
             </a:r>
-            <a:endParaRPr lang="pt-BR"/>
           </a:p>
         </p:txBody>
       </p:sp>
@@ -2498,38 +2479,37 @@
           <a:p>
             <a:pPr lvl="0"/>
             <a:r>
-              <a:rPr lang="pt-BR" smtClean="0"/>
+              <a:rPr lang="pt-BR"/>
               <a:t>Clique para editar o texto mestre</a:t>
             </a:r>
           </a:p>
           <a:p>
             <a:pPr lvl="1"/>
             <a:r>
-              <a:rPr lang="pt-BR" smtClean="0"/>
+              <a:rPr lang="pt-BR"/>
               <a:t>Segundo nível</a:t>
             </a:r>
           </a:p>
           <a:p>
             <a:pPr lvl="2"/>
             <a:r>
-              <a:rPr lang="pt-BR" smtClean="0"/>
+              <a:rPr lang="pt-BR"/>
               <a:t>Terceiro nível</a:t>
             </a:r>
           </a:p>
           <a:p>
             <a:pPr lvl="3"/>
             <a:r>
-              <a:rPr lang="pt-BR" smtClean="0"/>
+              <a:rPr lang="pt-BR"/>
               <a:t>Quarto nível</a:t>
             </a:r>
           </a:p>
           <a:p>
             <a:pPr lvl="4"/>
             <a:r>
-              <a:rPr lang="pt-BR" smtClean="0"/>
+              <a:rPr lang="pt-BR"/>
               <a:t>Quinto nível</a:t>
             </a:r>
-            <a:endParaRPr lang="pt-BR"/>
           </a:p>
         </p:txBody>
       </p:sp>
@@ -2568,7 +2548,7 @@
           <a:p>
             <a:fld id="{6F6F9BBC-5669-453D-8C75-07C41C1632E4}" type="datetimeFigureOut">
               <a:rPr lang="pt-BR" smtClean="0"/>
-              <a:t>18/10/2020</a:t>
+              <a:t>02/11/2020</a:t>
             </a:fld>
             <a:endParaRPr lang="pt-BR"/>
           </a:p>
@@ -2999,7 +2979,6 @@
               <a:rPr lang="pt-BR" sz="2800" dirty="0"/>
               <a:t>Capacidade: Tratar o orçamento</a:t>
             </a:r>
-            <a:endParaRPr lang="pt-BR" sz="2800" dirty="0"/>
           </a:p>
         </p:txBody>
       </p:sp>
@@ -3119,7 +3098,6 @@
               <a:rPr lang="pt-BR" sz="2800" dirty="0"/>
               <a:t>Capacidade: Tratar o pedido</a:t>
             </a:r>
-            <a:endParaRPr lang="pt-BR" sz="2800" dirty="0"/>
           </a:p>
         </p:txBody>
       </p:sp>
@@ -3209,7 +3187,6 @@
               <a:rPr lang="pt-BR" sz="2800" dirty="0"/>
               <a:t>Capacidade: Tratar o pedido</a:t>
             </a:r>
-            <a:endParaRPr lang="pt-BR" sz="2800" dirty="0"/>
           </a:p>
         </p:txBody>
       </p:sp>
@@ -3299,7 +3276,6 @@
               <a:rPr lang="pt-BR" sz="2800" dirty="0"/>
               <a:t>Capacidade: Tratar o pedido</a:t>
             </a:r>
-            <a:endParaRPr lang="pt-BR" sz="2800" dirty="0"/>
           </a:p>
         </p:txBody>
       </p:sp>
@@ -3355,7 +3331,7 @@
         </p:blipFill>
         <p:spPr>
           <a:xfrm>
-            <a:off x="2395537" y="1000125"/>
+            <a:off x="2395537" y="1357933"/>
             <a:ext cx="7400925" cy="4857750"/>
           </a:xfrm>
           <a:prstGeom prst="rect">
@@ -3389,7 +3365,6 @@
               <a:rPr lang="pt-BR" sz="2800" dirty="0"/>
               <a:t>Capacidade: Tratar o pedido</a:t>
             </a:r>
-            <a:endParaRPr lang="pt-BR" sz="2800" dirty="0"/>
           </a:p>
         </p:txBody>
       </p:sp>
@@ -3397,6 +3372,107 @@
     <p:extLst>
       <p:ext uri="{BB962C8B-B14F-4D97-AF65-F5344CB8AC3E}">
         <p14:creationId xmlns:p14="http://schemas.microsoft.com/office/powerpoint/2010/main" val="1918343710"/>
+      </p:ext>
+    </p:extLst>
+  </p:cSld>
+  <p:clrMapOvr>
+    <a:masterClrMapping/>
+  </p:clrMapOvr>
+</p:sld>
+</file>
+
+<file path=ppt/slides/slide6.xml><?xml version="1.0" encoding="utf-8"?>
+<p:sld xmlns:a="http://schemas.openxmlformats.org/drawingml/2006/main" xmlns:r="http://schemas.openxmlformats.org/officeDocument/2006/relationships" xmlns:p="http://schemas.openxmlformats.org/presentationml/2006/main">
+  <p:cSld>
+    <p:spTree>
+      <p:nvGrpSpPr>
+        <p:cNvPr id="1" name=""/>
+        <p:cNvGrpSpPr/>
+        <p:nvPr/>
+      </p:nvGrpSpPr>
+      <p:grpSpPr>
+        <a:xfrm>
+          <a:off x="0" y="0"/>
+          <a:ext cx="0" cy="0"/>
+          <a:chOff x="0" y="0"/>
+          <a:chExt cx="0" cy="0"/>
+        </a:xfrm>
+      </p:grpSpPr>
+      <p:sp>
+        <p:nvSpPr>
+          <p:cNvPr id="5" name="CaixaDeTexto 4">
+            <a:extLst>
+              <a:ext uri="{FF2B5EF4-FFF2-40B4-BE49-F238E27FC236}">
+                <a16:creationId xmlns:a16="http://schemas.microsoft.com/office/drawing/2014/main" id="{DBA597A0-6145-4396-BCF6-738553ABC03D}"/>
+              </a:ext>
+            </a:extLst>
+          </p:cNvPr>
+          <p:cNvSpPr txBox="1"/>
+          <p:nvPr/>
+        </p:nvSpPr>
+        <p:spPr>
+          <a:xfrm>
+            <a:off x="397565" y="332168"/>
+            <a:ext cx="6851373" cy="523220"/>
+          </a:xfrm>
+          <a:prstGeom prst="rect">
+            <a:avLst/>
+          </a:prstGeom>
+          <a:noFill/>
+        </p:spPr>
+        <p:txBody>
+          <a:bodyPr wrap="square">
+            <a:spAutoFit/>
+          </a:bodyPr>
+          <a:lstStyle/>
+          <a:p>
+            <a:r>
+              <a:rPr lang="pt-BR" sz="2800" dirty="0"/>
+              <a:t>Capacidade: Tratar cancelamento do pedido</a:t>
+            </a:r>
+          </a:p>
+        </p:txBody>
+      </p:sp>
+      <p:pic>
+        <p:nvPicPr>
+          <p:cNvPr id="3" name="Imagem 2">
+            <a:extLst>
+              <a:ext uri="{FF2B5EF4-FFF2-40B4-BE49-F238E27FC236}">
+                <a16:creationId xmlns:a16="http://schemas.microsoft.com/office/drawing/2014/main" id="{209805C4-09B6-4855-A604-3B3E00B08D0E}"/>
+              </a:ext>
+            </a:extLst>
+          </p:cNvPr>
+          <p:cNvPicPr>
+            <a:picLocks noChangeAspect="1"/>
+          </p:cNvPicPr>
+          <p:nvPr/>
+        </p:nvPicPr>
+        <p:blipFill>
+          <a:blip r:embed="rId2">
+            <a:extLst>
+              <a:ext uri="{28A0092B-C50C-407E-A947-70E740481C1C}">
+                <a14:useLocalDpi xmlns:a14="http://schemas.microsoft.com/office/drawing/2010/main" val="0"/>
+              </a:ext>
+            </a:extLst>
+          </a:blip>
+          <a:stretch>
+            <a:fillRect/>
+          </a:stretch>
+        </p:blipFill>
+        <p:spPr>
+          <a:xfrm>
+            <a:off x="2610678" y="997739"/>
+            <a:ext cx="6288571" cy="5528093"/>
+          </a:xfrm>
+          <a:prstGeom prst="rect">
+            <a:avLst/>
+          </a:prstGeom>
+        </p:spPr>
+      </p:pic>
+    </p:spTree>
+    <p:extLst>
+      <p:ext uri="{BB962C8B-B14F-4D97-AF65-F5344CB8AC3E}">
+        <p14:creationId xmlns:p14="http://schemas.microsoft.com/office/powerpoint/2010/main" val="1523249744"/>
       </p:ext>
     </p:extLst>
   </p:cSld>

</xml_diff>

<commit_message>
refatorando artefatos do 16 ao 19- feedback ac04 -eng requisitos
</commit_message>
<xml_diff>
--- a/artefatos/16 - DFD Essencial para cada Capacidade.pptx
+++ b/artefatos/16 - DFD Essencial para cada Capacidade.pptx
@@ -7,10 +7,11 @@
   <p:sldIdLst>
     <p:sldId id="256" r:id="rId2"/>
     <p:sldId id="257" r:id="rId3"/>
-    <p:sldId id="258" r:id="rId4"/>
-    <p:sldId id="259" r:id="rId5"/>
-    <p:sldId id="260" r:id="rId6"/>
-    <p:sldId id="261" r:id="rId7"/>
+    <p:sldId id="262" r:id="rId4"/>
+    <p:sldId id="258" r:id="rId5"/>
+    <p:sldId id="259" r:id="rId6"/>
+    <p:sldId id="260" r:id="rId7"/>
+    <p:sldId id="261" r:id="rId8"/>
   </p:sldIdLst>
   <p:sldSz cx="12192000" cy="6858000"/>
   <p:notesSz cx="6858000" cy="9144000"/>
@@ -246,7 +247,7 @@
           <a:p>
             <a:fld id="{6F6F9BBC-5669-453D-8C75-07C41C1632E4}" type="datetimeFigureOut">
               <a:rPr lang="pt-BR" smtClean="0"/>
-              <a:t>04/11/2020</a:t>
+              <a:t>12/11/2020</a:t>
             </a:fld>
             <a:endParaRPr lang="pt-BR"/>
           </a:p>
@@ -414,7 +415,7 @@
           <a:p>
             <a:fld id="{6F6F9BBC-5669-453D-8C75-07C41C1632E4}" type="datetimeFigureOut">
               <a:rPr lang="pt-BR" smtClean="0"/>
-              <a:t>04/11/2020</a:t>
+              <a:t>12/11/2020</a:t>
             </a:fld>
             <a:endParaRPr lang="pt-BR"/>
           </a:p>
@@ -592,7 +593,7 @@
           <a:p>
             <a:fld id="{6F6F9BBC-5669-453D-8C75-07C41C1632E4}" type="datetimeFigureOut">
               <a:rPr lang="pt-BR" smtClean="0"/>
-              <a:t>04/11/2020</a:t>
+              <a:t>12/11/2020</a:t>
             </a:fld>
             <a:endParaRPr lang="pt-BR"/>
           </a:p>
@@ -760,7 +761,7 @@
           <a:p>
             <a:fld id="{6F6F9BBC-5669-453D-8C75-07C41C1632E4}" type="datetimeFigureOut">
               <a:rPr lang="pt-BR" smtClean="0"/>
-              <a:t>04/11/2020</a:t>
+              <a:t>12/11/2020</a:t>
             </a:fld>
             <a:endParaRPr lang="pt-BR"/>
           </a:p>
@@ -1005,7 +1006,7 @@
           <a:p>
             <a:fld id="{6F6F9BBC-5669-453D-8C75-07C41C1632E4}" type="datetimeFigureOut">
               <a:rPr lang="pt-BR" smtClean="0"/>
-              <a:t>04/11/2020</a:t>
+              <a:t>12/11/2020</a:t>
             </a:fld>
             <a:endParaRPr lang="pt-BR"/>
           </a:p>
@@ -1234,7 +1235,7 @@
           <a:p>
             <a:fld id="{6F6F9BBC-5669-453D-8C75-07C41C1632E4}" type="datetimeFigureOut">
               <a:rPr lang="pt-BR" smtClean="0"/>
-              <a:t>04/11/2020</a:t>
+              <a:t>12/11/2020</a:t>
             </a:fld>
             <a:endParaRPr lang="pt-BR"/>
           </a:p>
@@ -1598,7 +1599,7 @@
           <a:p>
             <a:fld id="{6F6F9BBC-5669-453D-8C75-07C41C1632E4}" type="datetimeFigureOut">
               <a:rPr lang="pt-BR" smtClean="0"/>
-              <a:t>04/11/2020</a:t>
+              <a:t>12/11/2020</a:t>
             </a:fld>
             <a:endParaRPr lang="pt-BR"/>
           </a:p>
@@ -1715,7 +1716,7 @@
           <a:p>
             <a:fld id="{6F6F9BBC-5669-453D-8C75-07C41C1632E4}" type="datetimeFigureOut">
               <a:rPr lang="pt-BR" smtClean="0"/>
-              <a:t>04/11/2020</a:t>
+              <a:t>12/11/2020</a:t>
             </a:fld>
             <a:endParaRPr lang="pt-BR"/>
           </a:p>
@@ -1810,7 +1811,7 @@
           <a:p>
             <a:fld id="{6F6F9BBC-5669-453D-8C75-07C41C1632E4}" type="datetimeFigureOut">
               <a:rPr lang="pt-BR" smtClean="0"/>
-              <a:t>04/11/2020</a:t>
+              <a:t>12/11/2020</a:t>
             </a:fld>
             <a:endParaRPr lang="pt-BR"/>
           </a:p>
@@ -2085,7 +2086,7 @@
           <a:p>
             <a:fld id="{6F6F9BBC-5669-453D-8C75-07C41C1632E4}" type="datetimeFigureOut">
               <a:rPr lang="pt-BR" smtClean="0"/>
-              <a:t>04/11/2020</a:t>
+              <a:t>12/11/2020</a:t>
             </a:fld>
             <a:endParaRPr lang="pt-BR"/>
           </a:p>
@@ -2337,7 +2338,7 @@
           <a:p>
             <a:fld id="{6F6F9BBC-5669-453D-8C75-07C41C1632E4}" type="datetimeFigureOut">
               <a:rPr lang="pt-BR" smtClean="0"/>
-              <a:t>04/11/2020</a:t>
+              <a:t>12/11/2020</a:t>
             </a:fld>
             <a:endParaRPr lang="pt-BR"/>
           </a:p>
@@ -2548,7 +2549,7 @@
           <a:p>
             <a:fld id="{6F6F9BBC-5669-453D-8C75-07C41C1632E4}" type="datetimeFigureOut">
               <a:rPr lang="pt-BR" smtClean="0"/>
-              <a:t>04/11/2020</a:t>
+              <a:t>12/11/2020</a:t>
             </a:fld>
             <a:endParaRPr lang="pt-BR"/>
           </a:p>
@@ -3044,63 +3045,34 @@
       </p:grpSpPr>
       <p:pic>
         <p:nvPicPr>
-          <p:cNvPr id="3" name="Imagem 2"/>
+          <p:cNvPr id="5" name="Imagem 4">
+            <a:extLst>
+              <a:ext uri="{FF2B5EF4-FFF2-40B4-BE49-F238E27FC236}">
+                <a16:creationId xmlns:a16="http://schemas.microsoft.com/office/drawing/2014/main" id="{59808553-41BA-4F64-ABFD-3217135604AF}"/>
+              </a:ext>
+            </a:extLst>
+          </p:cNvPr>
           <p:cNvPicPr>
             <a:picLocks noChangeAspect="1"/>
           </p:cNvPicPr>
           <p:nvPr/>
         </p:nvPicPr>
         <p:blipFill>
-          <a:blip r:embed="rId2">
-            <a:extLst>
-              <a:ext uri="{28A0092B-C50C-407E-A947-70E740481C1C}">
-                <a14:useLocalDpi xmlns:a14="http://schemas.microsoft.com/office/drawing/2010/main" val="0"/>
-              </a:ext>
-            </a:extLst>
-          </a:blip>
+          <a:blip r:embed="rId2"/>
           <a:stretch>
             <a:fillRect/>
           </a:stretch>
         </p:blipFill>
         <p:spPr>
           <a:xfrm>
-            <a:off x="0" y="1039842"/>
-            <a:ext cx="12192000" cy="4778316"/>
+            <a:off x="3364049" y="483460"/>
+            <a:ext cx="5463901" cy="5605985"/>
           </a:xfrm>
           <a:prstGeom prst="rect">
             <a:avLst/>
           </a:prstGeom>
         </p:spPr>
       </p:pic>
-      <p:sp>
-        <p:nvSpPr>
-          <p:cNvPr id="4" name="CaixaDeTexto 3"/>
-          <p:cNvSpPr txBox="1"/>
-          <p:nvPr/>
-        </p:nvSpPr>
-        <p:spPr>
-          <a:xfrm>
-            <a:off x="268145" y="221850"/>
-            <a:ext cx="7500395" cy="523220"/>
-          </a:xfrm>
-          <a:prstGeom prst="rect">
-            <a:avLst/>
-          </a:prstGeom>
-          <a:noFill/>
-        </p:spPr>
-        <p:txBody>
-          <a:bodyPr wrap="square" rtlCol="0">
-            <a:spAutoFit/>
-          </a:bodyPr>
-          <a:lstStyle/>
-          <a:p>
-            <a:r>
-              <a:rPr lang="pt-BR" sz="2800" dirty="0"/>
-              <a:t>Capacidade: Tratar o pedido</a:t>
-            </a:r>
-          </a:p>
-        </p:txBody>
-      </p:sp>
     </p:spTree>
     <p:extLst>
       <p:ext uri="{BB962C8B-B14F-4D97-AF65-F5344CB8AC3E}">
@@ -3133,67 +3105,38 @@
       </p:grpSpPr>
       <p:pic>
         <p:nvPicPr>
-          <p:cNvPr id="3" name="Imagem 2"/>
+          <p:cNvPr id="5" name="Imagem 4">
+            <a:extLst>
+              <a:ext uri="{FF2B5EF4-FFF2-40B4-BE49-F238E27FC236}">
+                <a16:creationId xmlns:a16="http://schemas.microsoft.com/office/drawing/2014/main" id="{BBC2687F-651D-4CD3-BFA0-F3E311A7A333}"/>
+              </a:ext>
+            </a:extLst>
+          </p:cNvPr>
           <p:cNvPicPr>
             <a:picLocks noChangeAspect="1"/>
           </p:cNvPicPr>
           <p:nvPr/>
         </p:nvPicPr>
         <p:blipFill>
-          <a:blip r:embed="rId2">
-            <a:extLst>
-              <a:ext uri="{28A0092B-C50C-407E-A947-70E740481C1C}">
-                <a14:useLocalDpi xmlns:a14="http://schemas.microsoft.com/office/drawing/2010/main" val="0"/>
-              </a:ext>
-            </a:extLst>
-          </a:blip>
+          <a:blip r:embed="rId2"/>
           <a:stretch>
             <a:fillRect/>
           </a:stretch>
         </p:blipFill>
         <p:spPr>
           <a:xfrm>
-            <a:off x="1686644" y="982436"/>
-            <a:ext cx="9353550" cy="4981575"/>
+            <a:off x="1322772" y="186432"/>
+            <a:ext cx="9357065" cy="6207245"/>
           </a:xfrm>
           <a:prstGeom prst="rect">
             <a:avLst/>
           </a:prstGeom>
         </p:spPr>
       </p:pic>
-      <p:sp>
-        <p:nvSpPr>
-          <p:cNvPr id="4" name="CaixaDeTexto 3"/>
-          <p:cNvSpPr txBox="1"/>
-          <p:nvPr/>
-        </p:nvSpPr>
-        <p:spPr>
-          <a:xfrm>
-            <a:off x="268145" y="221850"/>
-            <a:ext cx="7500395" cy="523220"/>
-          </a:xfrm>
-          <a:prstGeom prst="rect">
-            <a:avLst/>
-          </a:prstGeom>
-          <a:noFill/>
-        </p:spPr>
-        <p:txBody>
-          <a:bodyPr wrap="square" rtlCol="0">
-            <a:spAutoFit/>
-          </a:bodyPr>
-          <a:lstStyle/>
-          <a:p>
-            <a:r>
-              <a:rPr lang="pt-BR" sz="2800" dirty="0"/>
-              <a:t>Capacidade: Tratar o pedido</a:t>
-            </a:r>
-          </a:p>
-        </p:txBody>
-      </p:sp>
     </p:spTree>
     <p:extLst>
       <p:ext uri="{BB962C8B-B14F-4D97-AF65-F5344CB8AC3E}">
-        <p14:creationId xmlns:p14="http://schemas.microsoft.com/office/powerpoint/2010/main" val="3404042280"/>
+        <p14:creationId xmlns:p14="http://schemas.microsoft.com/office/powerpoint/2010/main" val="3606179655"/>
       </p:ext>
     </p:extLst>
   </p:cSld>
@@ -3220,36 +3163,6 @@
           <a:chExt cx="0" cy="0"/>
         </a:xfrm>
       </p:grpSpPr>
-      <p:pic>
-        <p:nvPicPr>
-          <p:cNvPr id="2" name="Imagem 1"/>
-          <p:cNvPicPr>
-            <a:picLocks noChangeAspect="1"/>
-          </p:cNvPicPr>
-          <p:nvPr/>
-        </p:nvPicPr>
-        <p:blipFill>
-          <a:blip r:embed="rId2">
-            <a:extLst>
-              <a:ext uri="{28A0092B-C50C-407E-A947-70E740481C1C}">
-                <a14:useLocalDpi xmlns:a14="http://schemas.microsoft.com/office/drawing/2010/main" val="0"/>
-              </a:ext>
-            </a:extLst>
-          </a:blip>
-          <a:stretch>
-            <a:fillRect/>
-          </a:stretch>
-        </p:blipFill>
-        <p:spPr>
-          <a:xfrm>
-            <a:off x="2819400" y="938212"/>
-            <a:ext cx="6553200" cy="4981575"/>
-          </a:xfrm>
-          <a:prstGeom prst="rect">
-            <a:avLst/>
-          </a:prstGeom>
-        </p:spPr>
-      </p:pic>
       <p:sp>
         <p:nvSpPr>
           <p:cNvPr id="4" name="CaixaDeTexto 3"/>
@@ -3279,10 +3192,40 @@
           </a:p>
         </p:txBody>
       </p:sp>
+      <p:pic>
+        <p:nvPicPr>
+          <p:cNvPr id="5" name="Imagem 4">
+            <a:extLst>
+              <a:ext uri="{FF2B5EF4-FFF2-40B4-BE49-F238E27FC236}">
+                <a16:creationId xmlns:a16="http://schemas.microsoft.com/office/drawing/2014/main" id="{9094057A-4906-422A-B7F9-15FE39DB962F}"/>
+              </a:ext>
+            </a:extLst>
+          </p:cNvPr>
+          <p:cNvPicPr>
+            <a:picLocks noChangeAspect="1"/>
+          </p:cNvPicPr>
+          <p:nvPr/>
+        </p:nvPicPr>
+        <p:blipFill>
+          <a:blip r:embed="rId2"/>
+          <a:stretch>
+            <a:fillRect/>
+          </a:stretch>
+        </p:blipFill>
+        <p:spPr>
+          <a:xfrm>
+            <a:off x="1728187" y="919062"/>
+            <a:ext cx="8735626" cy="5717088"/>
+          </a:xfrm>
+          <a:prstGeom prst="rect">
+            <a:avLst/>
+          </a:prstGeom>
+        </p:spPr>
+      </p:pic>
     </p:spTree>
     <p:extLst>
       <p:ext uri="{BB962C8B-B14F-4D97-AF65-F5344CB8AC3E}">
-        <p14:creationId xmlns:p14="http://schemas.microsoft.com/office/powerpoint/2010/main" val="1860181057"/>
+        <p14:creationId xmlns:p14="http://schemas.microsoft.com/office/powerpoint/2010/main" val="3404042280"/>
       </p:ext>
     </p:extLst>
   </p:cSld>
@@ -3331,6 +3274,95 @@
         </p:blipFill>
         <p:spPr>
           <a:xfrm>
+            <a:off x="2819400" y="938212"/>
+            <a:ext cx="6553200" cy="4981575"/>
+          </a:xfrm>
+          <a:prstGeom prst="rect">
+            <a:avLst/>
+          </a:prstGeom>
+        </p:spPr>
+      </p:pic>
+      <p:sp>
+        <p:nvSpPr>
+          <p:cNvPr id="4" name="CaixaDeTexto 3"/>
+          <p:cNvSpPr txBox="1"/>
+          <p:nvPr/>
+        </p:nvSpPr>
+        <p:spPr>
+          <a:xfrm>
+            <a:off x="268145" y="221850"/>
+            <a:ext cx="7500395" cy="523220"/>
+          </a:xfrm>
+          <a:prstGeom prst="rect">
+            <a:avLst/>
+          </a:prstGeom>
+          <a:noFill/>
+        </p:spPr>
+        <p:txBody>
+          <a:bodyPr wrap="square" rtlCol="0">
+            <a:spAutoFit/>
+          </a:bodyPr>
+          <a:lstStyle/>
+          <a:p>
+            <a:r>
+              <a:rPr lang="pt-BR" sz="2800" dirty="0"/>
+              <a:t>Capacidade: Tratar o pedido</a:t>
+            </a:r>
+          </a:p>
+        </p:txBody>
+      </p:sp>
+    </p:spTree>
+    <p:extLst>
+      <p:ext uri="{BB962C8B-B14F-4D97-AF65-F5344CB8AC3E}">
+        <p14:creationId xmlns:p14="http://schemas.microsoft.com/office/powerpoint/2010/main" val="1860181057"/>
+      </p:ext>
+    </p:extLst>
+  </p:cSld>
+  <p:clrMapOvr>
+    <a:masterClrMapping/>
+  </p:clrMapOvr>
+</p:sld>
+</file>
+
+<file path=ppt/slides/slide6.xml><?xml version="1.0" encoding="utf-8"?>
+<p:sld xmlns:a="http://schemas.openxmlformats.org/drawingml/2006/main" xmlns:r="http://schemas.openxmlformats.org/officeDocument/2006/relationships" xmlns:p="http://schemas.openxmlformats.org/presentationml/2006/main">
+  <p:cSld>
+    <p:spTree>
+      <p:nvGrpSpPr>
+        <p:cNvPr id="1" name=""/>
+        <p:cNvGrpSpPr/>
+        <p:nvPr/>
+      </p:nvGrpSpPr>
+      <p:grpSpPr>
+        <a:xfrm>
+          <a:off x="0" y="0"/>
+          <a:ext cx="0" cy="0"/>
+          <a:chOff x="0" y="0"/>
+          <a:chExt cx="0" cy="0"/>
+        </a:xfrm>
+      </p:grpSpPr>
+      <p:pic>
+        <p:nvPicPr>
+          <p:cNvPr id="2" name="Imagem 1"/>
+          <p:cNvPicPr>
+            <a:picLocks noChangeAspect="1"/>
+          </p:cNvPicPr>
+          <p:nvPr/>
+        </p:nvPicPr>
+        <p:blipFill>
+          <a:blip r:embed="rId2">
+            <a:extLst>
+              <a:ext uri="{28A0092B-C50C-407E-A947-70E740481C1C}">
+                <a14:useLocalDpi xmlns:a14="http://schemas.microsoft.com/office/drawing/2010/main" val="0"/>
+              </a:ext>
+            </a:extLst>
+          </a:blip>
+          <a:stretch>
+            <a:fillRect/>
+          </a:stretch>
+        </p:blipFill>
+        <p:spPr>
+          <a:xfrm>
             <a:off x="2395537" y="1357933"/>
             <a:ext cx="7400925" cy="4857750"/>
           </a:xfrm>
@@ -3381,7 +3413,7 @@
 </p:sld>
 </file>
 
-<file path=ppt/slides/slide6.xml><?xml version="1.0" encoding="utf-8"?>
+<file path=ppt/slides/slide7.xml><?xml version="1.0" encoding="utf-8"?>
 <p:sld xmlns:a="http://schemas.openxmlformats.org/drawingml/2006/main" xmlns:r="http://schemas.openxmlformats.org/officeDocument/2006/relationships" xmlns:p="http://schemas.openxmlformats.org/presentationml/2006/main">
   <p:cSld>
     <p:spTree>

</xml_diff>